<commit_message>
UPDATE PROJECT THESIS ADD CDR and PI- UPDATE GP PRESENT
</commit_message>
<xml_diff>
--- a/Documentation/GP_Discussion.pptx
+++ b/Documentation/GP_Discussion.pptx
@@ -5,7 +5,7 @@
     <p:sldMasterId id="2147483648" r:id="rId1"/>
   </p:sldMasterIdLst>
   <p:notesMasterIdLst>
-    <p:notesMasterId r:id="rId29"/>
+    <p:notesMasterId r:id="rId30"/>
   </p:notesMasterIdLst>
   <p:sldIdLst>
     <p:sldId id="256" r:id="rId2"/>
@@ -33,8 +33,9 @@
     <p:sldId id="282" r:id="rId24"/>
     <p:sldId id="283" r:id="rId25"/>
     <p:sldId id="284" r:id="rId26"/>
-    <p:sldId id="285" r:id="rId27"/>
-    <p:sldId id="286" r:id="rId28"/>
+    <p:sldId id="287" r:id="rId27"/>
+    <p:sldId id="285" r:id="rId28"/>
+    <p:sldId id="286" r:id="rId29"/>
   </p:sldIdLst>
   <p:sldSz cx="12192000" cy="6858000"/>
   <p:notesSz cx="6858000" cy="9144000"/>
@@ -223,7 +224,7 @@
           <a:p>
             <a:fld id="{AB07E6AB-3158-44A8-B193-9D6CDF109827}" type="datetimeFigureOut">
               <a:rPr lang="en-US" smtClean="0"/>
-              <a:t>5/3/2024</a:t>
+              <a:t>5/4/2024</a:t>
             </a:fld>
             <a:endParaRPr lang="en-US"/>
           </a:p>
@@ -706,7 +707,7 @@
           <a:p>
             <a:fld id="{9E23922F-F27B-40E7-8CF2-764CB3A90641}" type="datetimeFigureOut">
               <a:rPr lang="en-US" smtClean="0"/>
-              <a:t>5/3/2024</a:t>
+              <a:t>5/4/2024</a:t>
             </a:fld>
             <a:endParaRPr lang="en-US"/>
           </a:p>
@@ -876,7 +877,7 @@
           <a:p>
             <a:fld id="{9E23922F-F27B-40E7-8CF2-764CB3A90641}" type="datetimeFigureOut">
               <a:rPr lang="en-US" smtClean="0"/>
-              <a:t>5/3/2024</a:t>
+              <a:t>5/4/2024</a:t>
             </a:fld>
             <a:endParaRPr lang="en-US"/>
           </a:p>
@@ -1056,7 +1057,7 @@
           <a:p>
             <a:fld id="{9E23922F-F27B-40E7-8CF2-764CB3A90641}" type="datetimeFigureOut">
               <a:rPr lang="en-US" smtClean="0"/>
-              <a:t>5/3/2024</a:t>
+              <a:t>5/4/2024</a:t>
             </a:fld>
             <a:endParaRPr lang="en-US"/>
           </a:p>
@@ -1226,7 +1227,7 @@
           <a:p>
             <a:fld id="{9E23922F-F27B-40E7-8CF2-764CB3A90641}" type="datetimeFigureOut">
               <a:rPr lang="en-US" smtClean="0"/>
-              <a:t>5/3/2024</a:t>
+              <a:t>5/4/2024</a:t>
             </a:fld>
             <a:endParaRPr lang="en-US"/>
           </a:p>
@@ -1472,7 +1473,7 @@
           <a:p>
             <a:fld id="{9E23922F-F27B-40E7-8CF2-764CB3A90641}" type="datetimeFigureOut">
               <a:rPr lang="en-US" smtClean="0"/>
-              <a:t>5/3/2024</a:t>
+              <a:t>5/4/2024</a:t>
             </a:fld>
             <a:endParaRPr lang="en-US"/>
           </a:p>
@@ -1704,7 +1705,7 @@
           <a:p>
             <a:fld id="{9E23922F-F27B-40E7-8CF2-764CB3A90641}" type="datetimeFigureOut">
               <a:rPr lang="en-US" smtClean="0"/>
-              <a:t>5/3/2024</a:t>
+              <a:t>5/4/2024</a:t>
             </a:fld>
             <a:endParaRPr lang="en-US"/>
           </a:p>
@@ -2071,7 +2072,7 @@
           <a:p>
             <a:fld id="{9E23922F-F27B-40E7-8CF2-764CB3A90641}" type="datetimeFigureOut">
               <a:rPr lang="en-US" smtClean="0"/>
-              <a:t>5/3/2024</a:t>
+              <a:t>5/4/2024</a:t>
             </a:fld>
             <a:endParaRPr lang="en-US"/>
           </a:p>
@@ -2189,7 +2190,7 @@
           <a:p>
             <a:fld id="{9E23922F-F27B-40E7-8CF2-764CB3A90641}" type="datetimeFigureOut">
               <a:rPr lang="en-US" smtClean="0"/>
-              <a:t>5/3/2024</a:t>
+              <a:t>5/4/2024</a:t>
             </a:fld>
             <a:endParaRPr lang="en-US"/>
           </a:p>
@@ -2284,7 +2285,7 @@
           <a:p>
             <a:fld id="{9E23922F-F27B-40E7-8CF2-764CB3A90641}" type="datetimeFigureOut">
               <a:rPr lang="en-US" smtClean="0"/>
-              <a:t>5/3/2024</a:t>
+              <a:t>5/4/2024</a:t>
             </a:fld>
             <a:endParaRPr lang="en-US"/>
           </a:p>
@@ -2561,7 +2562,7 @@
           <a:p>
             <a:fld id="{9E23922F-F27B-40E7-8CF2-764CB3A90641}" type="datetimeFigureOut">
               <a:rPr lang="en-US" smtClean="0"/>
-              <a:t>5/3/2024</a:t>
+              <a:t>5/4/2024</a:t>
             </a:fld>
             <a:endParaRPr lang="en-US"/>
           </a:p>
@@ -2814,7 +2815,7 @@
           <a:p>
             <a:fld id="{9E23922F-F27B-40E7-8CF2-764CB3A90641}" type="datetimeFigureOut">
               <a:rPr lang="en-US" smtClean="0"/>
-              <a:t>5/3/2024</a:t>
+              <a:t>5/4/2024</a:t>
             </a:fld>
             <a:endParaRPr lang="en-US"/>
           </a:p>
@@ -3027,7 +3028,7 @@
           <a:p>
             <a:fld id="{9E23922F-F27B-40E7-8CF2-764CB3A90641}" type="datetimeFigureOut">
               <a:rPr lang="en-US" smtClean="0"/>
-              <a:t>5/3/2024</a:t>
+              <a:t>5/4/2024</a:t>
             </a:fld>
             <a:endParaRPr lang="en-US"/>
           </a:p>
@@ -7084,17 +7085,7 @@
                   </a:schemeClr>
                 </a:solidFill>
               </a:rPr>
-              <a:t>CDR </a:t>
-            </a:r>
-            <a:r>
-              <a:rPr lang="en-US" sz="2400" dirty="0" smtClean="0">
-                <a:solidFill>
-                  <a:schemeClr val="bg1">
-                    <a:lumMod val="75000"/>
-                  </a:schemeClr>
-                </a:solidFill>
-              </a:rPr>
-              <a:t>Integration</a:t>
+              <a:t>CDR Integration</a:t>
             </a:r>
           </a:p>
           <a:p>
@@ -7643,11 +7634,11 @@
   <p:clrMapOvr>
     <a:masterClrMapping/>
   </p:clrMapOvr>
-  <mc:AlternateContent xmlns:mc="http://schemas.openxmlformats.org/markup-compatibility/2006">
-    <mc:Choice xmlns:p14="http://schemas.microsoft.com/office/powerpoint/2010/main" Requires="p14">
+  <mc:AlternateContent xmlns:mc="http://schemas.openxmlformats.org/markup-compatibility/2006" xmlns:p14="http://schemas.microsoft.com/office/powerpoint/2010/main">
+    <mc:Choice Requires="p14">
       <p:transition p14:dur="0"/>
     </mc:Choice>
-    <mc:Fallback>
+    <mc:Fallback xmlns="">
       <p:transition/>
     </mc:Fallback>
   </mc:AlternateContent>
@@ -10350,6 +10341,78 @@
           </a:p>
         </p:txBody>
       </p:sp>
+      <p:pic>
+        <p:nvPicPr>
+          <p:cNvPr id="2" name="Picture 1"/>
+          <p:cNvPicPr>
+            <a:picLocks noChangeAspect="1"/>
+          </p:cNvPicPr>
+          <p:nvPr/>
+        </p:nvPicPr>
+        <p:blipFill>
+          <a:blip r:embed="rId2"/>
+          <a:stretch>
+            <a:fillRect/>
+          </a:stretch>
+        </p:blipFill>
+        <p:spPr>
+          <a:xfrm>
+            <a:off x="666297" y="1214789"/>
+            <a:ext cx="5800537" cy="2587191"/>
+          </a:xfrm>
+          <a:prstGeom prst="rect">
+            <a:avLst/>
+          </a:prstGeom>
+        </p:spPr>
+      </p:pic>
+      <p:pic>
+        <p:nvPicPr>
+          <p:cNvPr id="3" name="Picture 2"/>
+          <p:cNvPicPr>
+            <a:picLocks noChangeAspect="1"/>
+          </p:cNvPicPr>
+          <p:nvPr/>
+        </p:nvPicPr>
+        <p:blipFill>
+          <a:blip r:embed="rId3"/>
+          <a:stretch>
+            <a:fillRect/>
+          </a:stretch>
+        </p:blipFill>
+        <p:spPr>
+          <a:xfrm>
+            <a:off x="7204106" y="1214789"/>
+            <a:ext cx="4846722" cy="3825109"/>
+          </a:xfrm>
+          <a:prstGeom prst="rect">
+            <a:avLst/>
+          </a:prstGeom>
+        </p:spPr>
+      </p:pic>
+      <p:pic>
+        <p:nvPicPr>
+          <p:cNvPr id="4" name="Picture 3"/>
+          <p:cNvPicPr>
+            <a:picLocks noChangeAspect="1"/>
+          </p:cNvPicPr>
+          <p:nvPr/>
+        </p:nvPicPr>
+        <p:blipFill>
+          <a:blip r:embed="rId4"/>
+          <a:stretch>
+            <a:fillRect/>
+          </a:stretch>
+        </p:blipFill>
+        <p:spPr>
+          <a:xfrm>
+            <a:off x="666297" y="4687503"/>
+            <a:ext cx="4814408" cy="1839277"/>
+          </a:xfrm>
+          <a:prstGeom prst="rect">
+            <a:avLst/>
+          </a:prstGeom>
+        </p:spPr>
+      </p:pic>
     </p:spTree>
     <p:extLst>
       <p:ext uri="{BB962C8B-B14F-4D97-AF65-F5344CB8AC3E}">
@@ -10360,11 +10423,11 @@
   <p:clrMapOvr>
     <a:masterClrMapping/>
   </p:clrMapOvr>
-  <mc:AlternateContent xmlns:mc="http://schemas.openxmlformats.org/markup-compatibility/2006">
-    <mc:Choice xmlns:p14="http://schemas.microsoft.com/office/powerpoint/2010/main" Requires="p14">
+  <mc:AlternateContent xmlns:mc="http://schemas.openxmlformats.org/markup-compatibility/2006" xmlns:p14="http://schemas.microsoft.com/office/powerpoint/2010/main">
+    <mc:Choice Requires="p14">
       <p:transition p14:dur="0"/>
     </mc:Choice>
-    <mc:Fallback>
+    <mc:Fallback xmlns="">
       <p:transition/>
     </mc:Fallback>
   </mc:AlternateContent>
@@ -10395,6 +10458,73 @@
           <a:chExt cx="0" cy="0"/>
         </a:xfrm>
       </p:grpSpPr>
+      <p:pic>
+        <p:nvPicPr>
+          <p:cNvPr id="6" name="Picture 5"/>
+          <p:cNvPicPr/>
+          <p:nvPr/>
+        </p:nvPicPr>
+        <p:blipFill>
+          <a:blip r:embed="rId2"/>
+          <a:stretch>
+            <a:fillRect/>
+          </a:stretch>
+        </p:blipFill>
+        <p:spPr>
+          <a:xfrm>
+            <a:off x="1405288" y="784458"/>
+            <a:ext cx="8124407" cy="3889433"/>
+          </a:xfrm>
+          <a:prstGeom prst="rect">
+            <a:avLst/>
+          </a:prstGeom>
+        </p:spPr>
+      </p:pic>
+    </p:spTree>
+    <p:extLst>
+      <p:ext uri="{BB962C8B-B14F-4D97-AF65-F5344CB8AC3E}">
+        <p14:creationId xmlns:p14="http://schemas.microsoft.com/office/powerpoint/2010/main" val="2112198863"/>
+      </p:ext>
+    </p:extLst>
+  </p:cSld>
+  <p:clrMapOvr>
+    <a:masterClrMapping/>
+  </p:clrMapOvr>
+  <mc:AlternateContent xmlns:mc="http://schemas.openxmlformats.org/markup-compatibility/2006" xmlns:p14="http://schemas.microsoft.com/office/powerpoint/2010/main">
+    <mc:Choice Requires="p14">
+      <p:transition p14:dur="0"/>
+    </mc:Choice>
+    <mc:Fallback xmlns="">
+      <p:transition/>
+    </mc:Fallback>
+  </mc:AlternateContent>
+  <p:timing>
+    <p:tnLst>
+      <p:par>
+        <p:cTn id="1" dur="indefinite" restart="never" nodeType="tmRoot"/>
+      </p:par>
+    </p:tnLst>
+  </p:timing>
+</p:sld>
+</file>
+
+<file path=ppt/slides/slide27.xml><?xml version="1.0" encoding="utf-8"?>
+<p:sld xmlns:a="http://schemas.openxmlformats.org/drawingml/2006/main" xmlns:r="http://schemas.openxmlformats.org/officeDocument/2006/relationships" xmlns:p="http://schemas.openxmlformats.org/presentationml/2006/main">
+  <p:cSld>
+    <p:spTree>
+      <p:nvGrpSpPr>
+        <p:cNvPr id="1" name=""/>
+        <p:cNvGrpSpPr/>
+        <p:nvPr/>
+      </p:nvGrpSpPr>
+      <p:grpSpPr>
+        <a:xfrm>
+          <a:off x="0" y="0"/>
+          <a:ext cx="0" cy="0"/>
+          <a:chOff x="0" y="0"/>
+          <a:chExt cx="0" cy="0"/>
+        </a:xfrm>
+      </p:grpSpPr>
       <p:sp>
         <p:nvSpPr>
           <p:cNvPr id="13" name="Rectangle 12"/>
@@ -10760,7 +10890,7 @@
 </p:sld>
 </file>
 
-<file path=ppt/slides/slide27.xml><?xml version="1.0" encoding="utf-8"?>
+<file path=ppt/slides/slide28.xml><?xml version="1.0" encoding="utf-8"?>
 <p:sld xmlns:a="http://schemas.openxmlformats.org/drawingml/2006/main" xmlns:r="http://schemas.openxmlformats.org/officeDocument/2006/relationships" xmlns:p="http://schemas.openxmlformats.org/presentationml/2006/main">
   <p:cSld>
     <p:spTree>

</xml_diff>